<commit_message>
fixed bad links in module00.html
</commit_message>
<xml_diff>
--- a/Slides/Lesson 0.5 Introduction to Git.pptx
+++ b/Slides/Lesson 0.5 Introduction to Git.pptx
@@ -29049,7 +29049,7 @@
           <a:p>
             <a:fld id="{DA6DF2C9-EBE4-4351-8E7C-99EF6186DA4A}" type="datetimeFigureOut">
               <a:rPr lang="en-US" smtClean="0"/>
-              <a:t>7/23/2017</a:t>
+              <a:t>7/27/2017</a:t>
             </a:fld>
             <a:endParaRPr lang="en-US"/>
           </a:p>
@@ -29495,7 +29495,7 @@
           <a:p>
             <a:fld id="{52F7EF0E-4991-462B-BCBC-694BF8FF3688}" type="datetime1">
               <a:rPr lang="en-US" smtClean="0"/>
-              <a:t>7/23/2017</a:t>
+              <a:t>7/27/2017</a:t>
             </a:fld>
             <a:endParaRPr lang="en-US"/>
           </a:p>
@@ -29659,7 +29659,7 @@
           <a:p>
             <a:fld id="{7248001E-7DBC-4AD3-B695-153B32E72DEB}" type="datetime1">
               <a:rPr lang="en-US" smtClean="0"/>
-              <a:t>7/23/2017</a:t>
+              <a:t>7/27/2017</a:t>
             </a:fld>
             <a:endParaRPr lang="en-US"/>
           </a:p>
@@ -29833,7 +29833,7 @@
           <a:p>
             <a:fld id="{6B68F95E-FC82-488B-97B3-253076412B55}" type="datetime1">
               <a:rPr lang="en-US" smtClean="0"/>
-              <a:t>7/23/2017</a:t>
+              <a:t>7/27/2017</a:t>
             </a:fld>
             <a:endParaRPr lang="en-US"/>
           </a:p>
@@ -29997,7 +29997,7 @@
           <a:p>
             <a:fld id="{562E238C-8F63-4660-A32A-C9B584CD1B02}" type="datetime1">
               <a:rPr lang="en-US" smtClean="0"/>
-              <a:t>7/23/2017</a:t>
+              <a:t>7/27/2017</a:t>
             </a:fld>
             <a:endParaRPr lang="en-US"/>
           </a:p>
@@ -30238,7 +30238,7 @@
           <a:p>
             <a:fld id="{4140B3D8-3199-4EDC-AFB8-E5E1023043D8}" type="datetime1">
               <a:rPr lang="en-US" smtClean="0"/>
-              <a:t>7/23/2017</a:t>
+              <a:t>7/27/2017</a:t>
             </a:fld>
             <a:endParaRPr lang="en-US"/>
           </a:p>
@@ -30519,7 +30519,7 @@
           <a:p>
             <a:fld id="{51485FBC-8459-4252-B46C-2615F0D54FC6}" type="datetime1">
               <a:rPr lang="en-US" smtClean="0"/>
-              <a:t>7/23/2017</a:t>
+              <a:t>7/27/2017</a:t>
             </a:fld>
             <a:endParaRPr lang="en-US"/>
           </a:p>
@@ -30934,7 +30934,7 @@
           <a:p>
             <a:fld id="{9AE380D9-9396-4976-888A-7F66E925443E}" type="datetime1">
               <a:rPr lang="en-US" smtClean="0"/>
-              <a:t>7/23/2017</a:t>
+              <a:t>7/27/2017</a:t>
             </a:fld>
             <a:endParaRPr lang="en-US"/>
           </a:p>
@@ -31047,7 +31047,7 @@
           <a:p>
             <a:fld id="{E272D5E2-7B37-4517-8EA5-A6DF76D7EE3F}" type="datetime1">
               <a:rPr lang="en-US" smtClean="0"/>
-              <a:t>7/23/2017</a:t>
+              <a:t>7/27/2017</a:t>
             </a:fld>
             <a:endParaRPr lang="en-US"/>
           </a:p>
@@ -31138,7 +31138,7 @@
           <a:p>
             <a:fld id="{590C6D0D-45DC-40A4-8EDC-8F932DB50654}" type="datetime1">
               <a:rPr lang="en-US" smtClean="0"/>
-              <a:t>7/23/2017</a:t>
+              <a:t>7/27/2017</a:t>
             </a:fld>
             <a:endParaRPr lang="en-US"/>
           </a:p>
@@ -31409,7 +31409,7 @@
           <a:p>
             <a:fld id="{B24C1E1B-D9BE-4D48-9550-F287D9BA16DE}" type="datetime1">
               <a:rPr lang="en-US" smtClean="0"/>
-              <a:t>7/23/2017</a:t>
+              <a:t>7/27/2017</a:t>
             </a:fld>
             <a:endParaRPr lang="en-US"/>
           </a:p>
@@ -31657,7 +31657,7 @@
           <a:p>
             <a:fld id="{6B0E4DC0-C2D6-4F3D-AA6C-29D7CF4C2F1A}" type="datetime1">
               <a:rPr lang="en-US" smtClean="0"/>
-              <a:t>7/23/2017</a:t>
+              <a:t>7/27/2017</a:t>
             </a:fld>
             <a:endParaRPr lang="en-US"/>
           </a:p>
@@ -31869,7 +31869,7 @@
           <a:p>
             <a:fld id="{0F518A1C-E434-4CD7-9618-B4C273088978}" type="datetime1">
               <a:rPr lang="en-US" smtClean="0"/>
-              <a:t>7/23/2017</a:t>
+              <a:t>7/27/2017</a:t>
             </a:fld>
             <a:endParaRPr lang="en-US"/>
           </a:p>
@@ -33778,7 +33778,7 @@
             </a:r>
             <a:r>
               <a:rPr lang="en-US" dirty="0"/>
-              <a:t> will merge the changes if possible.  If it can’t figure out how to the merge, you will get an error message.  We'll learn how to deal with these in the next lesson.</a:t>
+              <a:t> will merge the changes if possible.  If it can’t figure out how to the merge, you will get an error message.  We’ll talk about this some more a little later in this lesson.</a:t>
             </a:r>
           </a:p>
         </p:txBody>
@@ -38619,7 +38619,7 @@
         </p:nvSpPr>
         <p:spPr>
           <a:xfrm>
-            <a:off x="4739768" y="5796676"/>
+            <a:off x="4665877" y="5879939"/>
             <a:ext cx="3626864" cy="658973"/>
           </a:xfrm>
           <a:prstGeom prst="rect">

</xml_diff>